<commit_message>
finish compound interest work
</commit_message>
<xml_diff>
--- a/video_documents/Future Value with Compound Interest/Future Value with Compound Interest.pptx
+++ b/video_documents/Future Value with Compound Interest/Future Value with Compound Interest.pptx
@@ -109,6 +109,11 @@
       </a:defRPr>
     </a:lvl9pPr>
   </p:defaultTextStyle>
+  <p:extLst>
+    <p:ext uri="{EFAFB233-063F-42B5-8137-9DF3F51BA10A}">
+      <p15:sldGuideLst xmlns:p15="http://schemas.microsoft.com/office/powerpoint/2012/main"/>
+    </p:ext>
+  </p:extLst>
 </p:presentation>
 </file>
 
@@ -194,7 +199,7 @@
           <a:p>
             <a:fld id="{73F7307F-3E6A-4802-B975-3056F65E420B}" type="datetimeFigureOut">
               <a:rPr lang="en-US" smtClean="0"/>
-              <a:t>8/25/2024</a:t>
+              <a:t>8/26/2024</a:t>
             </a:fld>
             <a:endParaRPr lang="en-US"/>
           </a:p>
@@ -608,7 +613,7 @@
           <a:p>
             <a:fld id="{4E6B7D62-75F9-4FD6-9FE8-2FF204909750}" type="datetime1">
               <a:rPr lang="en-US" smtClean="0"/>
-              <a:t>8/25/2024</a:t>
+              <a:t>8/26/2024</a:t>
             </a:fld>
             <a:endParaRPr lang="en-US"/>
           </a:p>
@@ -809,7 +814,7 @@
           <a:p>
             <a:fld id="{51BE6542-6663-441E-97CD-133DCCF66B98}" type="datetime1">
               <a:rPr lang="en-US" smtClean="0"/>
-              <a:t>8/25/2024</a:t>
+              <a:t>8/26/2024</a:t>
             </a:fld>
             <a:endParaRPr lang="en-US"/>
           </a:p>
@@ -1020,7 +1025,7 @@
           <a:p>
             <a:fld id="{EAE80BE4-971D-487D-97DA-93B77C974AB1}" type="datetime1">
               <a:rPr lang="en-US" smtClean="0"/>
-              <a:t>8/25/2024</a:t>
+              <a:t>8/26/2024</a:t>
             </a:fld>
             <a:endParaRPr lang="en-US"/>
           </a:p>
@@ -1221,7 +1226,7 @@
           <a:p>
             <a:fld id="{BFB84BE6-5C3E-44D2-8438-DD3CC6D65EE1}" type="datetime1">
               <a:rPr lang="en-US" smtClean="0"/>
-              <a:t>8/25/2024</a:t>
+              <a:t>8/26/2024</a:t>
             </a:fld>
             <a:endParaRPr lang="en-US"/>
           </a:p>
@@ -1499,7 +1504,7 @@
           <a:p>
             <a:fld id="{B660A24D-4748-40D5-8886-71E9BE350E94}" type="datetime1">
               <a:rPr lang="en-US" smtClean="0"/>
-              <a:t>8/25/2024</a:t>
+              <a:t>8/26/2024</a:t>
             </a:fld>
             <a:endParaRPr lang="en-US"/>
           </a:p>
@@ -1767,7 +1772,7 @@
           <a:p>
             <a:fld id="{DB10346E-6100-497B-8FB8-D9AA8AE027BB}" type="datetime1">
               <a:rPr lang="en-US" smtClean="0"/>
-              <a:t>8/25/2024</a:t>
+              <a:t>8/26/2024</a:t>
             </a:fld>
             <a:endParaRPr lang="en-US"/>
           </a:p>
@@ -2182,7 +2187,7 @@
           <a:p>
             <a:fld id="{44BD735D-6785-40BC-A38A-FCCD967B96E1}" type="datetime1">
               <a:rPr lang="en-US" smtClean="0"/>
-              <a:t>8/25/2024</a:t>
+              <a:t>8/26/2024</a:t>
             </a:fld>
             <a:endParaRPr lang="en-US"/>
           </a:p>
@@ -2326,7 +2331,7 @@
           <a:p>
             <a:fld id="{D395C11A-B093-4958-B9DC-585E9AF452D0}" type="datetime1">
               <a:rPr lang="en-US" smtClean="0"/>
-              <a:t>8/25/2024</a:t>
+              <a:t>8/26/2024</a:t>
             </a:fld>
             <a:endParaRPr lang="en-US"/>
           </a:p>
@@ -2442,7 +2447,7 @@
           <a:p>
             <a:fld id="{2A1566ED-36C7-4602-BA78-22854AF621C4}" type="datetime1">
               <a:rPr lang="en-US" smtClean="0"/>
-              <a:t>8/25/2024</a:t>
+              <a:t>8/26/2024</a:t>
             </a:fld>
             <a:endParaRPr lang="en-US"/>
           </a:p>
@@ -2756,7 +2761,7 @@
           <a:p>
             <a:fld id="{8F3439AA-6E47-48D7-BF88-D8AFDAB2D86C}" type="datetime1">
               <a:rPr lang="en-US" smtClean="0"/>
-              <a:t>8/25/2024</a:t>
+              <a:t>8/26/2024</a:t>
             </a:fld>
             <a:endParaRPr lang="en-US"/>
           </a:p>
@@ -3047,7 +3052,7 @@
           <a:p>
             <a:fld id="{B12C25CE-F955-4F46-8BCF-4DCFFEFAAEBE}" type="datetime1">
               <a:rPr lang="en-US" smtClean="0"/>
-              <a:t>8/25/2024</a:t>
+              <a:t>8/26/2024</a:t>
             </a:fld>
             <a:endParaRPr lang="en-US"/>
           </a:p>
@@ -3291,7 +3296,7 @@
           <a:p>
             <a:fld id="{DF21DFC8-EDDF-4642-A487-B21571E13883}" type="datetime1">
               <a:rPr lang="en-US" smtClean="0"/>
-              <a:t>8/25/2024</a:t>
+              <a:t>8/26/2024</a:t>
             </a:fld>
             <a:endParaRPr lang="en-US"/>
           </a:p>
@@ -3854,8 +3859,8 @@
           </a:p>
         </p:txBody>
       </p:sp>
-      <mc:AlternateContent xmlns:mc="http://schemas.openxmlformats.org/markup-compatibility/2006">
-        <mc:Choice xmlns:a14="http://schemas.microsoft.com/office/drawing/2010/main" Requires="a14">
+      <mc:AlternateContent xmlns:mc="http://schemas.openxmlformats.org/markup-compatibility/2006" xmlns:a14="http://schemas.microsoft.com/office/drawing/2010/main">
+        <mc:Choice Requires="a14">
           <p:sp>
             <p:nvSpPr>
               <p:cNvPr id="3" name="Content Placeholder 2">
@@ -4095,7 +4100,7 @@
             </p:txBody>
           </p:sp>
         </mc:Choice>
-        <mc:Fallback>
+        <mc:Fallback xmlns="">
           <p:sp>
             <p:nvSpPr>
               <p:cNvPr id="3" name="Content Placeholder 2">
@@ -4173,6 +4178,308 @@
   <p:clrMapOvr>
     <a:masterClrMapping/>
   </p:clrMapOvr>
+  <p:timing>
+    <p:tnLst>
+      <p:par>
+        <p:cTn id="1" dur="indefinite" restart="never" nodeType="tmRoot">
+          <p:childTnLst>
+            <p:seq concurrent="1" nextAc="seek">
+              <p:cTn id="2" dur="indefinite" nodeType="mainSeq">
+                <p:childTnLst>
+                  <p:par>
+                    <p:cTn id="3" fill="hold">
+                      <p:stCondLst>
+                        <p:cond delay="indefinite"/>
+                        <p:cond evt="onBegin" delay="0">
+                          <p:tn val="2"/>
+                        </p:cond>
+                      </p:stCondLst>
+                      <p:childTnLst>
+                        <p:par>
+                          <p:cTn id="4" fill="hold">
+                            <p:stCondLst>
+                              <p:cond delay="0"/>
+                            </p:stCondLst>
+                            <p:childTnLst>
+                              <p:par>
+                                <p:cTn id="5" presetID="10" presetClass="entr" presetSubtype="0" fill="hold" nodeType="afterEffect">
+                                  <p:stCondLst>
+                                    <p:cond delay="3000"/>
+                                  </p:stCondLst>
+                                  <p:childTnLst>
+                                    <p:set>
+                                      <p:cBhvr>
+                                        <p:cTn id="6" dur="1" fill="hold">
+                                          <p:stCondLst>
+                                            <p:cond delay="0"/>
+                                          </p:stCondLst>
+                                        </p:cTn>
+                                        <p:tgtEl>
+                                          <p:spTgt spid="3">
+                                            <p:txEl>
+                                              <p:pRg st="1" end="1"/>
+                                            </p:txEl>
+                                          </p:spTgt>
+                                        </p:tgtEl>
+                                        <p:attrNameLst>
+                                          <p:attrName>style.visibility</p:attrName>
+                                        </p:attrNameLst>
+                                      </p:cBhvr>
+                                      <p:to>
+                                        <p:strVal val="visible"/>
+                                      </p:to>
+                                    </p:set>
+                                    <p:animEffect transition="in" filter="fade">
+                                      <p:cBhvr>
+                                        <p:cTn id="7" dur="500"/>
+                                        <p:tgtEl>
+                                          <p:spTgt spid="3">
+                                            <p:txEl>
+                                              <p:pRg st="1" end="1"/>
+                                            </p:txEl>
+                                          </p:spTgt>
+                                        </p:tgtEl>
+                                      </p:cBhvr>
+                                    </p:animEffect>
+                                  </p:childTnLst>
+                                </p:cTn>
+                              </p:par>
+                            </p:childTnLst>
+                          </p:cTn>
+                        </p:par>
+                        <p:par>
+                          <p:cTn id="8" fill="hold">
+                            <p:stCondLst>
+                              <p:cond delay="3500"/>
+                            </p:stCondLst>
+                            <p:childTnLst>
+                              <p:par>
+                                <p:cTn id="9" presetID="10" presetClass="entr" presetSubtype="0" fill="hold" nodeType="afterEffect">
+                                  <p:stCondLst>
+                                    <p:cond delay="3000"/>
+                                  </p:stCondLst>
+                                  <p:childTnLst>
+                                    <p:set>
+                                      <p:cBhvr>
+                                        <p:cTn id="10" dur="1" fill="hold">
+                                          <p:stCondLst>
+                                            <p:cond delay="0"/>
+                                          </p:stCondLst>
+                                        </p:cTn>
+                                        <p:tgtEl>
+                                          <p:spTgt spid="3">
+                                            <p:txEl>
+                                              <p:pRg st="2" end="2"/>
+                                            </p:txEl>
+                                          </p:spTgt>
+                                        </p:tgtEl>
+                                        <p:attrNameLst>
+                                          <p:attrName>style.visibility</p:attrName>
+                                        </p:attrNameLst>
+                                      </p:cBhvr>
+                                      <p:to>
+                                        <p:strVal val="visible"/>
+                                      </p:to>
+                                    </p:set>
+                                    <p:animEffect transition="in" filter="fade">
+                                      <p:cBhvr>
+                                        <p:cTn id="11" dur="500"/>
+                                        <p:tgtEl>
+                                          <p:spTgt spid="3">
+                                            <p:txEl>
+                                              <p:pRg st="2" end="2"/>
+                                            </p:txEl>
+                                          </p:spTgt>
+                                        </p:tgtEl>
+                                      </p:cBhvr>
+                                    </p:animEffect>
+                                  </p:childTnLst>
+                                </p:cTn>
+                              </p:par>
+                            </p:childTnLst>
+                          </p:cTn>
+                        </p:par>
+                        <p:par>
+                          <p:cTn id="12" fill="hold">
+                            <p:stCondLst>
+                              <p:cond delay="7000"/>
+                            </p:stCondLst>
+                            <p:childTnLst>
+                              <p:par>
+                                <p:cTn id="13" presetID="10" presetClass="entr" presetSubtype="0" fill="hold" nodeType="afterEffect">
+                                  <p:stCondLst>
+                                    <p:cond delay="3000"/>
+                                  </p:stCondLst>
+                                  <p:childTnLst>
+                                    <p:set>
+                                      <p:cBhvr>
+                                        <p:cTn id="14" dur="1" fill="hold">
+                                          <p:stCondLst>
+                                            <p:cond delay="0"/>
+                                          </p:stCondLst>
+                                        </p:cTn>
+                                        <p:tgtEl>
+                                          <p:spTgt spid="3">
+                                            <p:txEl>
+                                              <p:pRg st="3" end="3"/>
+                                            </p:txEl>
+                                          </p:spTgt>
+                                        </p:tgtEl>
+                                        <p:attrNameLst>
+                                          <p:attrName>style.visibility</p:attrName>
+                                        </p:attrNameLst>
+                                      </p:cBhvr>
+                                      <p:to>
+                                        <p:strVal val="visible"/>
+                                      </p:to>
+                                    </p:set>
+                                    <p:animEffect transition="in" filter="fade">
+                                      <p:cBhvr>
+                                        <p:cTn id="15" dur="500"/>
+                                        <p:tgtEl>
+                                          <p:spTgt spid="3">
+                                            <p:txEl>
+                                              <p:pRg st="3" end="3"/>
+                                            </p:txEl>
+                                          </p:spTgt>
+                                        </p:tgtEl>
+                                      </p:cBhvr>
+                                    </p:animEffect>
+                                  </p:childTnLst>
+                                </p:cTn>
+                              </p:par>
+                            </p:childTnLst>
+                          </p:cTn>
+                        </p:par>
+                        <p:par>
+                          <p:cTn id="16" fill="hold">
+                            <p:stCondLst>
+                              <p:cond delay="10500"/>
+                            </p:stCondLst>
+                            <p:childTnLst>
+                              <p:par>
+                                <p:cTn id="17" presetID="10" presetClass="entr" presetSubtype="0" fill="hold" nodeType="afterEffect">
+                                  <p:stCondLst>
+                                    <p:cond delay="3000"/>
+                                  </p:stCondLst>
+                                  <p:childTnLst>
+                                    <p:set>
+                                      <p:cBhvr>
+                                        <p:cTn id="18" dur="1" fill="hold">
+                                          <p:stCondLst>
+                                            <p:cond delay="0"/>
+                                          </p:stCondLst>
+                                        </p:cTn>
+                                        <p:tgtEl>
+                                          <p:spTgt spid="3">
+                                            <p:txEl>
+                                              <p:pRg st="4" end="4"/>
+                                            </p:txEl>
+                                          </p:spTgt>
+                                        </p:tgtEl>
+                                        <p:attrNameLst>
+                                          <p:attrName>style.visibility</p:attrName>
+                                        </p:attrNameLst>
+                                      </p:cBhvr>
+                                      <p:to>
+                                        <p:strVal val="visible"/>
+                                      </p:to>
+                                    </p:set>
+                                    <p:animEffect transition="in" filter="fade">
+                                      <p:cBhvr>
+                                        <p:cTn id="19" dur="500"/>
+                                        <p:tgtEl>
+                                          <p:spTgt spid="3">
+                                            <p:txEl>
+                                              <p:pRg st="4" end="4"/>
+                                            </p:txEl>
+                                          </p:spTgt>
+                                        </p:tgtEl>
+                                      </p:cBhvr>
+                                    </p:animEffect>
+                                  </p:childTnLst>
+                                </p:cTn>
+                              </p:par>
+                            </p:childTnLst>
+                          </p:cTn>
+                        </p:par>
+                        <p:par>
+                          <p:cTn id="20" fill="hold">
+                            <p:stCondLst>
+                              <p:cond delay="14000"/>
+                            </p:stCondLst>
+                            <p:childTnLst>
+                              <p:par>
+                                <p:cTn id="21" presetID="10" presetClass="entr" presetSubtype="0" fill="hold" nodeType="afterEffect">
+                                  <p:stCondLst>
+                                    <p:cond delay="3000"/>
+                                  </p:stCondLst>
+                                  <p:childTnLst>
+                                    <p:set>
+                                      <p:cBhvr>
+                                        <p:cTn id="22" dur="1" fill="hold">
+                                          <p:stCondLst>
+                                            <p:cond delay="0"/>
+                                          </p:stCondLst>
+                                        </p:cTn>
+                                        <p:tgtEl>
+                                          <p:spTgt spid="3">
+                                            <p:txEl>
+                                              <p:pRg st="5" end="5"/>
+                                            </p:txEl>
+                                          </p:spTgt>
+                                        </p:tgtEl>
+                                        <p:attrNameLst>
+                                          <p:attrName>style.visibility</p:attrName>
+                                        </p:attrNameLst>
+                                      </p:cBhvr>
+                                      <p:to>
+                                        <p:strVal val="visible"/>
+                                      </p:to>
+                                    </p:set>
+                                    <p:animEffect transition="in" filter="fade">
+                                      <p:cBhvr>
+                                        <p:cTn id="23" dur="500"/>
+                                        <p:tgtEl>
+                                          <p:spTgt spid="3">
+                                            <p:txEl>
+                                              <p:pRg st="5" end="5"/>
+                                            </p:txEl>
+                                          </p:spTgt>
+                                        </p:tgtEl>
+                                      </p:cBhvr>
+                                    </p:animEffect>
+                                  </p:childTnLst>
+                                </p:cTn>
+                              </p:par>
+                            </p:childTnLst>
+                          </p:cTn>
+                        </p:par>
+                      </p:childTnLst>
+                    </p:cTn>
+                  </p:par>
+                </p:childTnLst>
+              </p:cTn>
+              <p:prevCondLst>
+                <p:cond evt="onPrev" delay="0">
+                  <p:tgtEl>
+                    <p:sldTgt/>
+                  </p:tgtEl>
+                </p:cond>
+              </p:prevCondLst>
+              <p:nextCondLst>
+                <p:cond evt="onNext" delay="0">
+                  <p:tgtEl>
+                    <p:sldTgt/>
+                  </p:tgtEl>
+                </p:cond>
+              </p:nextCondLst>
+            </p:seq>
+          </p:childTnLst>
+        </p:cTn>
+      </p:par>
+    </p:tnLst>
+  </p:timing>
 </p:sld>
 </file>
 
@@ -4212,7 +4519,7 @@
         <p:spPr>
           <a:xfrm>
             <a:off x="838200" y="365125"/>
-            <a:ext cx="5257800" cy="1325563"/>
+            <a:ext cx="5334000" cy="725121"/>
           </a:xfrm>
         </p:spPr>
         <p:txBody>
@@ -4239,54 +4546,696 @@
             <a:spLocks noGrp="1"/>
           </p:cNvSpPr>
           <p:nvPr>
-            <p:ph idx="1"/>
+            <p:ph sz="half" idx="1"/>
           </p:nvPr>
         </p:nvSpPr>
         <p:spPr>
           <a:xfrm>
-            <a:off x="838200" y="1825625"/>
-            <a:ext cx="5257800" cy="2623827"/>
+            <a:off x="838201" y="1090246"/>
+            <a:ext cx="5181600" cy="2180493"/>
           </a:xfrm>
         </p:spPr>
         <p:txBody>
+          <a:bodyPr>
+            <a:normAutofit lnSpcReduction="10000"/>
+          </a:bodyPr>
+          <a:lstStyle/>
+          <a:p>
+            <a:pPr marL="0" indent="0">
+              <a:buNone/>
+            </a:pPr>
+            <a:r>
+              <a:rPr lang="en-US" dirty="0"/>
+              <a:t>Calculate the future value of an account with compound interest. The principal is $3000, the annual interest rate is 3%, compounding is quarterly, and the term is 4 years.</a:t>
+            </a:r>
+          </a:p>
+        </p:txBody>
+      </p:sp>
+      <mc:AlternateContent xmlns:mc="http://schemas.openxmlformats.org/markup-compatibility/2006" xmlns:a14="http://schemas.microsoft.com/office/drawing/2010/main">
+        <mc:Choice Requires="a14">
+          <p:sp>
+            <p:nvSpPr>
+              <p:cNvPr id="5" name="Content Placeholder 4">
+                <a:extLst>
+                  <a:ext uri="{FF2B5EF4-FFF2-40B4-BE49-F238E27FC236}">
+                    <a16:creationId xmlns:a16="http://schemas.microsoft.com/office/drawing/2014/main" id="{79CBF4C5-259B-985D-E5AC-A67A4C859999}"/>
+                  </a:ext>
+                </a:extLst>
+              </p:cNvPr>
+              <p:cNvSpPr>
+                <a:spLocks noGrp="1"/>
+              </p:cNvSpPr>
+              <p:nvPr>
+                <p:ph sz="half" idx="2"/>
+              </p:nvPr>
+            </p:nvSpPr>
+            <p:spPr>
+              <a:xfrm>
+                <a:off x="6172200" y="365125"/>
+                <a:ext cx="5181600" cy="5811838"/>
+              </a:xfrm>
+            </p:spPr>
+            <p:txBody>
+              <a:bodyPr>
+                <a:normAutofit lnSpcReduction="10000"/>
+              </a:bodyPr>
+              <a:lstStyle/>
+              <a:p>
+                <a:pPr marL="0" indent="0">
+                  <a:lnSpc>
+                    <a:spcPct val="110000"/>
+                  </a:lnSpc>
+                  <a:buNone/>
+                </a:pPr>
+                <a14:m>
+                  <m:oMathPara xmlns:m="http://schemas.openxmlformats.org/officeDocument/2006/math">
+                    <m:oMathParaPr>
+                      <m:jc m:val="centerGroup"/>
+                    </m:oMathParaPr>
+                    <m:oMath xmlns:m="http://schemas.openxmlformats.org/officeDocument/2006/math">
+                      <m:r>
+                        <a:rPr lang="en-US" b="0" i="1" smtClean="0">
+                          <a:latin typeface="Cambria Math" panose="02040503050406030204" pitchFamily="18" charset="0"/>
+                        </a:rPr>
+                        <m:t>𝐴</m:t>
+                      </m:r>
+                      <m:r>
+                        <a:rPr lang="en-US" b="0" i="1" smtClean="0">
+                          <a:latin typeface="Cambria Math" panose="02040503050406030204" pitchFamily="18" charset="0"/>
+                        </a:rPr>
+                        <m:t>=</m:t>
+                      </m:r>
+                      <m:r>
+                        <a:rPr lang="en-US" b="0" i="1" smtClean="0">
+                          <a:latin typeface="Cambria Math" panose="02040503050406030204" pitchFamily="18" charset="0"/>
+                        </a:rPr>
+                        <m:t>𝑃</m:t>
+                      </m:r>
+                      <m:sSup>
+                        <m:sSupPr>
+                          <m:ctrlPr>
+                            <a:rPr lang="en-US" b="0" i="1" smtClean="0">
+                              <a:latin typeface="Cambria Math" panose="02040503050406030204" pitchFamily="18" charset="0"/>
+                            </a:rPr>
+                          </m:ctrlPr>
+                        </m:sSupPr>
+                        <m:e>
+                          <m:d>
+                            <m:dPr>
+                              <m:ctrlPr>
+                                <a:rPr lang="en-US" b="0" i="1" smtClean="0">
+                                  <a:latin typeface="Cambria Math" panose="02040503050406030204" pitchFamily="18" charset="0"/>
+                                </a:rPr>
+                              </m:ctrlPr>
+                            </m:dPr>
+                            <m:e>
+                              <m:r>
+                                <a:rPr lang="en-US" b="0" i="1" smtClean="0">
+                                  <a:latin typeface="Cambria Math" panose="02040503050406030204" pitchFamily="18" charset="0"/>
+                                </a:rPr>
+                                <m:t>1+</m:t>
+                              </m:r>
+                              <m:f>
+                                <m:fPr>
+                                  <m:ctrlPr>
+                                    <a:rPr lang="en-US" b="0" i="1" smtClean="0">
+                                      <a:latin typeface="Cambria Math" panose="02040503050406030204" pitchFamily="18" charset="0"/>
+                                    </a:rPr>
+                                  </m:ctrlPr>
+                                </m:fPr>
+                                <m:num>
+                                  <m:r>
+                                    <a:rPr lang="en-US" b="0" i="1" smtClean="0">
+                                      <a:latin typeface="Cambria Math" panose="02040503050406030204" pitchFamily="18" charset="0"/>
+                                    </a:rPr>
+                                    <m:t>𝑟</m:t>
+                                  </m:r>
+                                </m:num>
+                                <m:den>
+                                  <m:r>
+                                    <a:rPr lang="en-US" b="0" i="1" smtClean="0">
+                                      <a:latin typeface="Cambria Math" panose="02040503050406030204" pitchFamily="18" charset="0"/>
+                                    </a:rPr>
+                                    <m:t>𝑛</m:t>
+                                  </m:r>
+                                </m:den>
+                              </m:f>
+                            </m:e>
+                          </m:d>
+                        </m:e>
+                        <m:sup>
+                          <m:r>
+                            <a:rPr lang="en-US" b="0" i="1" smtClean="0">
+                              <a:latin typeface="Cambria Math" panose="02040503050406030204" pitchFamily="18" charset="0"/>
+                            </a:rPr>
+                            <m:t>𝑛</m:t>
+                          </m:r>
+                          <m:r>
+                            <a:rPr lang="en-US" b="0" i="1" smtClean="0">
+                              <a:latin typeface="Cambria Math" panose="02040503050406030204" pitchFamily="18" charset="0"/>
+                            </a:rPr>
+                            <m:t>⋅</m:t>
+                          </m:r>
+                          <m:r>
+                            <a:rPr lang="en-US" b="0" i="1" smtClean="0">
+                              <a:latin typeface="Cambria Math" panose="02040503050406030204" pitchFamily="18" charset="0"/>
+                            </a:rPr>
+                            <m:t>𝑡</m:t>
+                          </m:r>
+                        </m:sup>
+                      </m:sSup>
+                    </m:oMath>
+                  </m:oMathPara>
+                </a14:m>
+                <a:endParaRPr lang="en-US" dirty="0"/>
+              </a:p>
+              <a:p>
+                <a:pPr marL="0" indent="0">
+                  <a:lnSpc>
+                    <a:spcPct val="110000"/>
+                  </a:lnSpc>
+                  <a:buNone/>
+                </a:pPr>
+                <a14:m>
+                  <m:oMathPara xmlns:m="http://schemas.openxmlformats.org/officeDocument/2006/math">
+                    <m:oMathParaPr>
+                      <m:jc m:val="centerGroup"/>
+                    </m:oMathParaPr>
+                    <m:oMath xmlns:m="http://schemas.openxmlformats.org/officeDocument/2006/math">
+                      <m:r>
+                        <a:rPr lang="en-US" b="0" i="1" smtClean="0">
+                          <a:latin typeface="Cambria Math" panose="02040503050406030204" pitchFamily="18" charset="0"/>
+                        </a:rPr>
+                        <m:t>𝐴</m:t>
+                      </m:r>
+                      <m:r>
+                        <a:rPr lang="en-US" b="0" i="1" smtClean="0">
+                          <a:latin typeface="Cambria Math" panose="02040503050406030204" pitchFamily="18" charset="0"/>
+                        </a:rPr>
+                        <m:t>=3000</m:t>
+                      </m:r>
+                      <m:sSup>
+                        <m:sSupPr>
+                          <m:ctrlPr>
+                            <a:rPr lang="en-US" b="0" i="1" smtClean="0">
+                              <a:latin typeface="Cambria Math" panose="02040503050406030204" pitchFamily="18" charset="0"/>
+                            </a:rPr>
+                          </m:ctrlPr>
+                        </m:sSupPr>
+                        <m:e>
+                          <m:d>
+                            <m:dPr>
+                              <m:ctrlPr>
+                                <a:rPr lang="en-US" b="0" i="1" smtClean="0">
+                                  <a:latin typeface="Cambria Math" panose="02040503050406030204" pitchFamily="18" charset="0"/>
+                                </a:rPr>
+                              </m:ctrlPr>
+                            </m:dPr>
+                            <m:e>
+                              <m:r>
+                                <a:rPr lang="en-US" b="0" i="1" smtClean="0">
+                                  <a:latin typeface="Cambria Math" panose="02040503050406030204" pitchFamily="18" charset="0"/>
+                                </a:rPr>
+                                <m:t>1+</m:t>
+                              </m:r>
+                              <m:f>
+                                <m:fPr>
+                                  <m:ctrlPr>
+                                    <a:rPr lang="en-US" b="0" i="1" smtClean="0">
+                                      <a:latin typeface="Cambria Math" panose="02040503050406030204" pitchFamily="18" charset="0"/>
+                                    </a:rPr>
+                                  </m:ctrlPr>
+                                </m:fPr>
+                                <m:num>
+                                  <m:r>
+                                    <a:rPr lang="en-US" b="0" i="1" smtClean="0">
+                                      <a:latin typeface="Cambria Math" panose="02040503050406030204" pitchFamily="18" charset="0"/>
+                                    </a:rPr>
+                                    <m:t>0.03</m:t>
+                                  </m:r>
+                                </m:num>
+                                <m:den>
+                                  <m:r>
+                                    <a:rPr lang="en-US" b="0" i="1" smtClean="0">
+                                      <a:latin typeface="Cambria Math" panose="02040503050406030204" pitchFamily="18" charset="0"/>
+                                    </a:rPr>
+                                    <m:t>4</m:t>
+                                  </m:r>
+                                </m:den>
+                              </m:f>
+                            </m:e>
+                          </m:d>
+                        </m:e>
+                        <m:sup>
+                          <m:r>
+                            <a:rPr lang="en-US" b="0" i="1" smtClean="0">
+                              <a:latin typeface="Cambria Math" panose="02040503050406030204" pitchFamily="18" charset="0"/>
+                            </a:rPr>
+                            <m:t>4⋅6</m:t>
+                          </m:r>
+                        </m:sup>
+                      </m:sSup>
+                    </m:oMath>
+                  </m:oMathPara>
+                </a14:m>
+                <a:endParaRPr lang="en-US" b="0" dirty="0"/>
+              </a:p>
+              <a:p>
+                <a:pPr marL="0" indent="0">
+                  <a:lnSpc>
+                    <a:spcPct val="110000"/>
+                  </a:lnSpc>
+                  <a:buNone/>
+                </a:pPr>
+                <a14:m>
+                  <m:oMathPara xmlns:m="http://schemas.openxmlformats.org/officeDocument/2006/math">
+                    <m:oMathParaPr>
+                      <m:jc m:val="centerGroup"/>
+                    </m:oMathParaPr>
+                    <m:oMath xmlns:m="http://schemas.openxmlformats.org/officeDocument/2006/math">
+                      <m:r>
+                        <a:rPr lang="en-US" b="0" i="1" smtClean="0">
+                          <a:latin typeface="Cambria Math" panose="02040503050406030204" pitchFamily="18" charset="0"/>
+                        </a:rPr>
+                        <m:t>𝐴</m:t>
+                      </m:r>
+                      <m:r>
+                        <a:rPr lang="en-US" b="0" i="1" smtClean="0">
+                          <a:latin typeface="Cambria Math" panose="02040503050406030204" pitchFamily="18" charset="0"/>
+                        </a:rPr>
+                        <m:t>=3000</m:t>
+                      </m:r>
+                      <m:sSup>
+                        <m:sSupPr>
+                          <m:ctrlPr>
+                            <a:rPr lang="en-US" b="0" i="1" smtClean="0">
+                              <a:latin typeface="Cambria Math" panose="02040503050406030204" pitchFamily="18" charset="0"/>
+                            </a:rPr>
+                          </m:ctrlPr>
+                        </m:sSupPr>
+                        <m:e>
+                          <m:d>
+                            <m:dPr>
+                              <m:ctrlPr>
+                                <a:rPr lang="en-US" b="0" i="1" smtClean="0">
+                                  <a:latin typeface="Cambria Math" panose="02040503050406030204" pitchFamily="18" charset="0"/>
+                                </a:rPr>
+                              </m:ctrlPr>
+                            </m:dPr>
+                            <m:e>
+                              <m:r>
+                                <a:rPr lang="en-US" b="0" i="1" smtClean="0">
+                                  <a:latin typeface="Cambria Math" panose="02040503050406030204" pitchFamily="18" charset="0"/>
+                                </a:rPr>
+                                <m:t>1+0.0075</m:t>
+                              </m:r>
+                            </m:e>
+                          </m:d>
+                        </m:e>
+                        <m:sup>
+                          <m:r>
+                            <a:rPr lang="en-US" b="0" i="1" smtClean="0">
+                              <a:latin typeface="Cambria Math" panose="02040503050406030204" pitchFamily="18" charset="0"/>
+                            </a:rPr>
+                            <m:t>24</m:t>
+                          </m:r>
+                        </m:sup>
+                      </m:sSup>
+                    </m:oMath>
+                  </m:oMathPara>
+                </a14:m>
+                <a:endParaRPr lang="en-US" b="0" dirty="0"/>
+              </a:p>
+              <a:p>
+                <a:pPr marL="0" indent="0">
+                  <a:lnSpc>
+                    <a:spcPct val="110000"/>
+                  </a:lnSpc>
+                  <a:buNone/>
+                </a:pPr>
+                <a14:m>
+                  <m:oMathPara xmlns:m="http://schemas.openxmlformats.org/officeDocument/2006/math">
+                    <m:oMathParaPr>
+                      <m:jc m:val="centerGroup"/>
+                    </m:oMathParaPr>
+                    <m:oMath xmlns:m="http://schemas.openxmlformats.org/officeDocument/2006/math">
+                      <m:r>
+                        <a:rPr lang="en-US" b="0" i="1" smtClean="0">
+                          <a:latin typeface="Cambria Math" panose="02040503050406030204" pitchFamily="18" charset="0"/>
+                        </a:rPr>
+                        <m:t>𝐴</m:t>
+                      </m:r>
+                      <m:r>
+                        <a:rPr lang="en-US" b="0" i="1" smtClean="0">
+                          <a:latin typeface="Cambria Math" panose="02040503050406030204" pitchFamily="18" charset="0"/>
+                        </a:rPr>
+                        <m:t>=3000</m:t>
+                      </m:r>
+                      <m:sSup>
+                        <m:sSupPr>
+                          <m:ctrlPr>
+                            <a:rPr lang="en-US" b="0" i="1" smtClean="0">
+                              <a:latin typeface="Cambria Math" panose="02040503050406030204" pitchFamily="18" charset="0"/>
+                            </a:rPr>
+                          </m:ctrlPr>
+                        </m:sSupPr>
+                        <m:e>
+                          <m:d>
+                            <m:dPr>
+                              <m:ctrlPr>
+                                <a:rPr lang="en-US" b="0" i="1" smtClean="0">
+                                  <a:latin typeface="Cambria Math" panose="02040503050406030204" pitchFamily="18" charset="0"/>
+                                </a:rPr>
+                              </m:ctrlPr>
+                            </m:dPr>
+                            <m:e>
+                              <m:r>
+                                <a:rPr lang="en-US" b="0" i="1" smtClean="0">
+                                  <a:latin typeface="Cambria Math" panose="02040503050406030204" pitchFamily="18" charset="0"/>
+                                </a:rPr>
+                                <m:t>1.0075</m:t>
+                              </m:r>
+                            </m:e>
+                          </m:d>
+                        </m:e>
+                        <m:sup>
+                          <m:r>
+                            <a:rPr lang="en-US" b="0" i="1" smtClean="0">
+                              <a:latin typeface="Cambria Math" panose="02040503050406030204" pitchFamily="18" charset="0"/>
+                            </a:rPr>
+                            <m:t>24</m:t>
+                          </m:r>
+                        </m:sup>
+                      </m:sSup>
+                    </m:oMath>
+                  </m:oMathPara>
+                </a14:m>
+                <a:endParaRPr lang="en-US" dirty="0"/>
+              </a:p>
+              <a:p>
+                <a:pPr marL="0" indent="0">
+                  <a:lnSpc>
+                    <a:spcPct val="110000"/>
+                  </a:lnSpc>
+                  <a:buNone/>
+                </a:pPr>
+                <a14:m>
+                  <m:oMathPara xmlns:m="http://schemas.openxmlformats.org/officeDocument/2006/math">
+                    <m:oMathParaPr>
+                      <m:jc m:val="centerGroup"/>
+                    </m:oMathParaPr>
+                    <m:oMath xmlns:m="http://schemas.openxmlformats.org/officeDocument/2006/math">
+                      <m:r>
+                        <a:rPr lang="en-US" b="0" i="1" smtClean="0">
+                          <a:latin typeface="Cambria Math" panose="02040503050406030204" pitchFamily="18" charset="0"/>
+                        </a:rPr>
+                        <m:t>𝐴</m:t>
+                      </m:r>
+                      <m:r>
+                        <a:rPr lang="en-US" b="0" i="1" smtClean="0">
+                          <a:latin typeface="Cambria Math" panose="02040503050406030204" pitchFamily="18" charset="0"/>
+                        </a:rPr>
+                        <m:t>=3000⋅1.19641</m:t>
+                      </m:r>
+                    </m:oMath>
+                  </m:oMathPara>
+                </a14:m>
+                <a:endParaRPr lang="en-US" b="0" dirty="0"/>
+              </a:p>
+              <a:p>
+                <a:pPr marL="0" indent="0">
+                  <a:lnSpc>
+                    <a:spcPct val="110000"/>
+                  </a:lnSpc>
+                  <a:buNone/>
+                </a:pPr>
+                <a:r>
+                  <a:rPr lang="en-US" dirty="0"/>
+                  <a:t>Write 5 decimal digits. Keep results in calculator.</a:t>
+                </a:r>
+                <a:endParaRPr lang="en-US" b="0" dirty="0"/>
+              </a:p>
+              <a:p>
+                <a:pPr marL="0" indent="0">
+                  <a:lnSpc>
+                    <a:spcPct val="110000"/>
+                  </a:lnSpc>
+                  <a:buNone/>
+                </a:pPr>
+                <a14:m>
+                  <m:oMathPara xmlns:m="http://schemas.openxmlformats.org/officeDocument/2006/math">
+                    <m:oMathParaPr>
+                      <m:jc m:val="centerGroup"/>
+                    </m:oMathParaPr>
+                    <m:oMath xmlns:m="http://schemas.openxmlformats.org/officeDocument/2006/math">
+                      <m:r>
+                        <a:rPr lang="en-US" b="0" i="1" smtClean="0">
+                          <a:latin typeface="Cambria Math" panose="02040503050406030204" pitchFamily="18" charset="0"/>
+                        </a:rPr>
+                        <m:t>𝐴</m:t>
+                      </m:r>
+                      <m:r>
+                        <a:rPr lang="en-US" b="0" i="1" smtClean="0">
+                          <a:latin typeface="Cambria Math" panose="02040503050406030204" pitchFamily="18" charset="0"/>
+                        </a:rPr>
+                        <m:t>=3589.240588</m:t>
+                      </m:r>
+                    </m:oMath>
+                  </m:oMathPara>
+                </a14:m>
+                <a:endParaRPr lang="en-US" dirty="0"/>
+              </a:p>
+              <a:p>
+                <a:pPr marL="0" indent="0">
+                  <a:lnSpc>
+                    <a:spcPct val="110000"/>
+                  </a:lnSpc>
+                  <a:buNone/>
+                </a:pPr>
+                <a:r>
+                  <a:rPr lang="en-US" dirty="0"/>
+                  <a:t>The future value is $3589.24.</a:t>
+                </a:r>
+              </a:p>
+            </p:txBody>
+          </p:sp>
+        </mc:Choice>
+        <mc:Fallback xmlns="">
+          <p:sp>
+            <p:nvSpPr>
+              <p:cNvPr id="5" name="Content Placeholder 4">
+                <a:extLst>
+                  <a:ext uri="{FF2B5EF4-FFF2-40B4-BE49-F238E27FC236}">
+                    <a16:creationId xmlns:a16="http://schemas.microsoft.com/office/drawing/2014/main" id="{79CBF4C5-259B-985D-E5AC-A67A4C859999}"/>
+                  </a:ext>
+                </a:extLst>
+              </p:cNvPr>
+              <p:cNvSpPr>
+                <a:spLocks noGrp="1" noRot="1" noChangeAspect="1" noMove="1" noResize="1" noEditPoints="1" noAdjustHandles="1" noChangeArrowheads="1" noChangeShapeType="1" noTextEdit="1"/>
+              </p:cNvSpPr>
+              <p:nvPr>
+                <p:ph sz="half" idx="2"/>
+              </p:nvPr>
+            </p:nvSpPr>
+            <p:spPr>
+              <a:xfrm>
+                <a:off x="6172200" y="365125"/>
+                <a:ext cx="5181600" cy="5811838"/>
+              </a:xfrm>
+              <a:blipFill>
+                <a:blip r:embed="rId2"/>
+                <a:stretch>
+                  <a:fillRect l="-2471"/>
+                </a:stretch>
+              </a:blipFill>
+            </p:spPr>
+            <p:txBody>
+              <a:bodyPr/>
+              <a:lstStyle/>
+              <a:p>
+                <a:r>
+                  <a:rPr lang="en-US">
+                    <a:noFill/>
+                  </a:rPr>
+                  <a:t> </a:t>
+                </a:r>
+              </a:p>
+            </p:txBody>
+          </p:sp>
+        </mc:Fallback>
+      </mc:AlternateContent>
+      <p:sp>
+        <p:nvSpPr>
+          <p:cNvPr id="4" name="Footer Placeholder 3">
+            <a:extLst>
+              <a:ext uri="{FF2B5EF4-FFF2-40B4-BE49-F238E27FC236}">
+                <a16:creationId xmlns:a16="http://schemas.microsoft.com/office/drawing/2014/main" id="{A7221740-CFA1-7085-7DCF-F4A95357F2BD}"/>
+              </a:ext>
+            </a:extLst>
+          </p:cNvPr>
+          <p:cNvSpPr>
+            <a:spLocks noGrp="1"/>
+          </p:cNvSpPr>
+          <p:nvPr>
+            <p:ph type="ftr" sz="quarter" idx="11"/>
+          </p:nvPr>
+        </p:nvSpPr>
+        <p:spPr/>
+        <p:txBody>
           <a:bodyPr/>
           <a:lstStyle/>
           <a:p>
             <a:r>
-              <a:rPr lang="en-US" dirty="0"/>
-              <a:t>Calculate the future value of an account with compound interest. The principal is $3000, the annual interest rate is 3%, compounding is quarterly, and the term is 4 years.</a:t>
-            </a:r>
-          </a:p>
-        </p:txBody>
-      </p:sp>
-      <p:sp>
-        <p:nvSpPr>
-          <p:cNvPr id="4" name="Footer Placeholder 3">
-            <a:extLst>
-              <a:ext uri="{FF2B5EF4-FFF2-40B4-BE49-F238E27FC236}">
-                <a16:creationId xmlns:a16="http://schemas.microsoft.com/office/drawing/2014/main" id="{A7221740-CFA1-7085-7DCF-F4A95357F2BD}"/>
-              </a:ext>
-            </a:extLst>
-          </p:cNvPr>
-          <p:cNvSpPr>
-            <a:spLocks noGrp="1"/>
-          </p:cNvSpPr>
-          <p:nvPr>
-            <p:ph type="ftr" sz="quarter" idx="11"/>
-          </p:nvPr>
-        </p:nvSpPr>
-        <p:spPr/>
-        <p:txBody>
-          <a:bodyPr/>
-          <a:lstStyle/>
-          <a:p>
-            <a:r>
               <a:rPr lang="en-US"/>
               <a:t>Access for free at https://openstax.org/books/contemporary-mathematics/pages/1-introduction</a:t>
             </a:r>
           </a:p>
         </p:txBody>
       </p:sp>
+      <p:pic>
+        <p:nvPicPr>
+          <p:cNvPr id="15" name="Picture 14" descr="A screenshot of a video game">
+            <a:extLst>
+              <a:ext uri="{FF2B5EF4-FFF2-40B4-BE49-F238E27FC236}">
+                <a16:creationId xmlns:a16="http://schemas.microsoft.com/office/drawing/2014/main" id="{FA9C23F0-9F1B-7125-000A-2BD4B16C4F7E}"/>
+              </a:ext>
+            </a:extLst>
+          </p:cNvPr>
+          <p:cNvPicPr>
+            <a:picLocks noChangeAspect="1"/>
+          </p:cNvPicPr>
+          <p:nvPr/>
+        </p:nvPicPr>
+        <p:blipFill>
+          <a:blip r:embed="rId3">
+            <a:extLst>
+              <a:ext uri="{28A0092B-C50C-407E-A947-70E740481C1C}">
+                <a14:useLocalDpi xmlns:a14="http://schemas.microsoft.com/office/drawing/2010/main" val="0"/>
+              </a:ext>
+            </a:extLst>
+          </a:blip>
+          <a:stretch>
+            <a:fillRect/>
+          </a:stretch>
+        </p:blipFill>
+        <p:spPr>
+          <a:xfrm>
+            <a:off x="838200" y="3183617"/>
+            <a:ext cx="4340469" cy="3259855"/>
+          </a:xfrm>
+          <a:prstGeom prst="rect">
+            <a:avLst/>
+          </a:prstGeom>
+        </p:spPr>
+      </p:pic>
+      <p:pic>
+        <p:nvPicPr>
+          <p:cNvPr id="17" name="Picture 16" descr="A screenshot of a video game">
+            <a:extLst>
+              <a:ext uri="{FF2B5EF4-FFF2-40B4-BE49-F238E27FC236}">
+                <a16:creationId xmlns:a16="http://schemas.microsoft.com/office/drawing/2014/main" id="{4C028961-4274-E1D8-D436-90F940BA159D}"/>
+              </a:ext>
+            </a:extLst>
+          </p:cNvPr>
+          <p:cNvPicPr>
+            <a:picLocks noChangeAspect="1"/>
+          </p:cNvPicPr>
+          <p:nvPr/>
+        </p:nvPicPr>
+        <p:blipFill>
+          <a:blip r:embed="rId4">
+            <a:extLst>
+              <a:ext uri="{28A0092B-C50C-407E-A947-70E740481C1C}">
+                <a14:useLocalDpi xmlns:a14="http://schemas.microsoft.com/office/drawing/2010/main" val="0"/>
+              </a:ext>
+            </a:extLst>
+          </a:blip>
+          <a:stretch>
+            <a:fillRect/>
+          </a:stretch>
+        </p:blipFill>
+        <p:spPr>
+          <a:xfrm>
+            <a:off x="838199" y="3183617"/>
+            <a:ext cx="4340470" cy="3259855"/>
+          </a:xfrm>
+          <a:prstGeom prst="rect">
+            <a:avLst/>
+          </a:prstGeom>
+        </p:spPr>
+      </p:pic>
+      <p:pic>
+        <p:nvPicPr>
+          <p:cNvPr id="19" name="Picture 18" descr="A screenshot of a computer&#10;&#10;Description automatically generated">
+            <a:extLst>
+              <a:ext uri="{FF2B5EF4-FFF2-40B4-BE49-F238E27FC236}">
+                <a16:creationId xmlns:a16="http://schemas.microsoft.com/office/drawing/2014/main" id="{5FC728EA-490C-F4E8-585D-3F13784EDAC3}"/>
+              </a:ext>
+            </a:extLst>
+          </p:cNvPr>
+          <p:cNvPicPr>
+            <a:picLocks noChangeAspect="1"/>
+          </p:cNvPicPr>
+          <p:nvPr/>
+        </p:nvPicPr>
+        <p:blipFill>
+          <a:blip r:embed="rId5">
+            <a:extLst>
+              <a:ext uri="{28A0092B-C50C-407E-A947-70E740481C1C}">
+                <a14:useLocalDpi xmlns:a14="http://schemas.microsoft.com/office/drawing/2010/main" val="0"/>
+              </a:ext>
+            </a:extLst>
+          </a:blip>
+          <a:stretch>
+            <a:fillRect/>
+          </a:stretch>
+        </p:blipFill>
+        <p:spPr>
+          <a:xfrm>
+            <a:off x="838199" y="3183617"/>
+            <a:ext cx="4340470" cy="3259855"/>
+          </a:xfrm>
+          <a:prstGeom prst="rect">
+            <a:avLst/>
+          </a:prstGeom>
+        </p:spPr>
+      </p:pic>
+      <p:pic>
+        <p:nvPicPr>
+          <p:cNvPr id="21" name="Picture 20" descr="A screenshot of a computer screen">
+            <a:extLst>
+              <a:ext uri="{FF2B5EF4-FFF2-40B4-BE49-F238E27FC236}">
+                <a16:creationId xmlns:a16="http://schemas.microsoft.com/office/drawing/2014/main" id="{50F0C693-8D52-BB86-2345-FA7262096E80}"/>
+              </a:ext>
+            </a:extLst>
+          </p:cNvPr>
+          <p:cNvPicPr>
+            <a:picLocks noChangeAspect="1"/>
+          </p:cNvPicPr>
+          <p:nvPr/>
+        </p:nvPicPr>
+        <p:blipFill>
+          <a:blip r:embed="rId6">
+            <a:extLst>
+              <a:ext uri="{28A0092B-C50C-407E-A947-70E740481C1C}">
+                <a14:useLocalDpi xmlns:a14="http://schemas.microsoft.com/office/drawing/2010/main" val="0"/>
+              </a:ext>
+            </a:extLst>
+          </a:blip>
+          <a:stretch>
+            <a:fillRect/>
+          </a:stretch>
+        </p:blipFill>
+        <p:spPr>
+          <a:xfrm>
+            <a:off x="838198" y="3183618"/>
+            <a:ext cx="4340469" cy="3259854"/>
+          </a:xfrm>
+          <a:prstGeom prst="rect">
+            <a:avLst/>
+          </a:prstGeom>
+        </p:spPr>
+      </p:pic>
     </p:spTree>
     <p:extLst>
       <p:ext uri="{BB962C8B-B14F-4D97-AF65-F5344CB8AC3E}">
@@ -4297,6 +5246,512 @@
   <p:clrMapOvr>
     <a:masterClrMapping/>
   </p:clrMapOvr>
+  <p:timing>
+    <p:tnLst>
+      <p:par>
+        <p:cTn id="1" dur="indefinite" restart="never" nodeType="tmRoot">
+          <p:childTnLst>
+            <p:seq concurrent="1" nextAc="seek">
+              <p:cTn id="2" dur="indefinite" nodeType="mainSeq">
+                <p:childTnLst>
+                  <p:par>
+                    <p:cTn id="3" fill="hold">
+                      <p:stCondLst>
+                        <p:cond delay="indefinite"/>
+                        <p:cond evt="onBegin" delay="0">
+                          <p:tn val="2"/>
+                        </p:cond>
+                      </p:stCondLst>
+                      <p:childTnLst>
+                        <p:par>
+                          <p:cTn id="4" fill="hold">
+                            <p:stCondLst>
+                              <p:cond delay="0"/>
+                            </p:stCondLst>
+                            <p:childTnLst>
+                              <p:par>
+                                <p:cTn id="5" presetID="1" presetClass="entr" presetSubtype="0" fill="hold" nodeType="afterEffect">
+                                  <p:stCondLst>
+                                    <p:cond delay="3000"/>
+                                  </p:stCondLst>
+                                  <p:childTnLst>
+                                    <p:set>
+                                      <p:cBhvr>
+                                        <p:cTn id="6" dur="1" fill="hold">
+                                          <p:stCondLst>
+                                            <p:cond delay="0"/>
+                                          </p:stCondLst>
+                                        </p:cTn>
+                                        <p:tgtEl>
+                                          <p:spTgt spid="5">
+                                            <p:txEl>
+                                              <p:pRg st="0" end="0"/>
+                                            </p:txEl>
+                                          </p:spTgt>
+                                        </p:tgtEl>
+                                        <p:attrNameLst>
+                                          <p:attrName>style.visibility</p:attrName>
+                                        </p:attrNameLst>
+                                      </p:cBhvr>
+                                      <p:to>
+                                        <p:strVal val="visible"/>
+                                      </p:to>
+                                    </p:set>
+                                  </p:childTnLst>
+                                </p:cTn>
+                              </p:par>
+                            </p:childTnLst>
+                          </p:cTn>
+                        </p:par>
+                        <p:par>
+                          <p:cTn id="7" fill="hold">
+                            <p:stCondLst>
+                              <p:cond delay="3000"/>
+                            </p:stCondLst>
+                            <p:childTnLst>
+                              <p:par>
+                                <p:cTn id="8" presetID="1" presetClass="entr" presetSubtype="0" fill="hold" nodeType="afterEffect">
+                                  <p:stCondLst>
+                                    <p:cond delay="3000"/>
+                                  </p:stCondLst>
+                                  <p:childTnLst>
+                                    <p:set>
+                                      <p:cBhvr>
+                                        <p:cTn id="9" dur="1" fill="hold">
+                                          <p:stCondLst>
+                                            <p:cond delay="0"/>
+                                          </p:stCondLst>
+                                        </p:cTn>
+                                        <p:tgtEl>
+                                          <p:spTgt spid="5">
+                                            <p:txEl>
+                                              <p:pRg st="1" end="1"/>
+                                            </p:txEl>
+                                          </p:spTgt>
+                                        </p:tgtEl>
+                                        <p:attrNameLst>
+                                          <p:attrName>style.visibility</p:attrName>
+                                        </p:attrNameLst>
+                                      </p:cBhvr>
+                                      <p:to>
+                                        <p:strVal val="visible"/>
+                                      </p:to>
+                                    </p:set>
+                                  </p:childTnLst>
+                                </p:cTn>
+                              </p:par>
+                            </p:childTnLst>
+                          </p:cTn>
+                        </p:par>
+                        <p:par>
+                          <p:cTn id="10" fill="hold">
+                            <p:stCondLst>
+                              <p:cond delay="6000"/>
+                            </p:stCondLst>
+                            <p:childTnLst>
+                              <p:par>
+                                <p:cTn id="11" presetID="1" presetClass="entr" presetSubtype="0" fill="hold" nodeType="afterEffect">
+                                  <p:stCondLst>
+                                    <p:cond delay="3000"/>
+                                  </p:stCondLst>
+                                  <p:childTnLst>
+                                    <p:set>
+                                      <p:cBhvr>
+                                        <p:cTn id="12" dur="1" fill="hold">
+                                          <p:stCondLst>
+                                            <p:cond delay="0"/>
+                                          </p:stCondLst>
+                                        </p:cTn>
+                                        <p:tgtEl>
+                                          <p:spTgt spid="5">
+                                            <p:txEl>
+                                              <p:pRg st="2" end="2"/>
+                                            </p:txEl>
+                                          </p:spTgt>
+                                        </p:tgtEl>
+                                        <p:attrNameLst>
+                                          <p:attrName>style.visibility</p:attrName>
+                                        </p:attrNameLst>
+                                      </p:cBhvr>
+                                      <p:to>
+                                        <p:strVal val="visible"/>
+                                      </p:to>
+                                    </p:set>
+                                  </p:childTnLst>
+                                </p:cTn>
+                              </p:par>
+                            </p:childTnLst>
+                          </p:cTn>
+                        </p:par>
+                        <p:par>
+                          <p:cTn id="13" fill="hold">
+                            <p:stCondLst>
+                              <p:cond delay="9000"/>
+                            </p:stCondLst>
+                            <p:childTnLst>
+                              <p:par>
+                                <p:cTn id="14" presetID="1" presetClass="entr" presetSubtype="0" fill="hold" nodeType="afterEffect">
+                                  <p:stCondLst>
+                                    <p:cond delay="0"/>
+                                  </p:stCondLst>
+                                  <p:childTnLst>
+                                    <p:set>
+                                      <p:cBhvr>
+                                        <p:cTn id="15" dur="1" fill="hold">
+                                          <p:stCondLst>
+                                            <p:cond delay="0"/>
+                                          </p:stCondLst>
+                                        </p:cTn>
+                                        <p:tgtEl>
+                                          <p:spTgt spid="15"/>
+                                        </p:tgtEl>
+                                        <p:attrNameLst>
+                                          <p:attrName>style.visibility</p:attrName>
+                                        </p:attrNameLst>
+                                      </p:cBhvr>
+                                      <p:to>
+                                        <p:strVal val="visible"/>
+                                      </p:to>
+                                    </p:set>
+                                  </p:childTnLst>
+                                </p:cTn>
+                              </p:par>
+                            </p:childTnLst>
+                          </p:cTn>
+                        </p:par>
+                        <p:par>
+                          <p:cTn id="16" fill="hold">
+                            <p:stCondLst>
+                              <p:cond delay="9000"/>
+                            </p:stCondLst>
+                            <p:childTnLst>
+                              <p:par>
+                                <p:cTn id="17" presetID="1" presetClass="entr" presetSubtype="0" fill="hold" nodeType="afterEffect">
+                                  <p:stCondLst>
+                                    <p:cond delay="3000"/>
+                                  </p:stCondLst>
+                                  <p:childTnLst>
+                                    <p:set>
+                                      <p:cBhvr>
+                                        <p:cTn id="18" dur="1" fill="hold">
+                                          <p:stCondLst>
+                                            <p:cond delay="0"/>
+                                          </p:stCondLst>
+                                        </p:cTn>
+                                        <p:tgtEl>
+                                          <p:spTgt spid="5">
+                                            <p:txEl>
+                                              <p:pRg st="3" end="3"/>
+                                            </p:txEl>
+                                          </p:spTgt>
+                                        </p:tgtEl>
+                                        <p:attrNameLst>
+                                          <p:attrName>style.visibility</p:attrName>
+                                        </p:attrNameLst>
+                                      </p:cBhvr>
+                                      <p:to>
+                                        <p:strVal val="visible"/>
+                                      </p:to>
+                                    </p:set>
+                                  </p:childTnLst>
+                                </p:cTn>
+                              </p:par>
+                            </p:childTnLst>
+                          </p:cTn>
+                        </p:par>
+                        <p:par>
+                          <p:cTn id="19" fill="hold">
+                            <p:stCondLst>
+                              <p:cond delay="12000"/>
+                            </p:stCondLst>
+                            <p:childTnLst>
+                              <p:par>
+                                <p:cTn id="20" presetID="1" presetClass="entr" presetSubtype="0" fill="hold" nodeType="afterEffect">
+                                  <p:stCondLst>
+                                    <p:cond delay="0"/>
+                                  </p:stCondLst>
+                                  <p:childTnLst>
+                                    <p:set>
+                                      <p:cBhvr>
+                                        <p:cTn id="21" dur="1" fill="hold">
+                                          <p:stCondLst>
+                                            <p:cond delay="0"/>
+                                          </p:stCondLst>
+                                        </p:cTn>
+                                        <p:tgtEl>
+                                          <p:spTgt spid="17"/>
+                                        </p:tgtEl>
+                                        <p:attrNameLst>
+                                          <p:attrName>style.visibility</p:attrName>
+                                        </p:attrNameLst>
+                                      </p:cBhvr>
+                                      <p:to>
+                                        <p:strVal val="visible"/>
+                                      </p:to>
+                                    </p:set>
+                                  </p:childTnLst>
+                                </p:cTn>
+                              </p:par>
+                            </p:childTnLst>
+                          </p:cTn>
+                        </p:par>
+                        <p:par>
+                          <p:cTn id="22" fill="hold">
+                            <p:stCondLst>
+                              <p:cond delay="12000"/>
+                            </p:stCondLst>
+                            <p:childTnLst>
+                              <p:par>
+                                <p:cTn id="23" presetID="1" presetClass="entr" presetSubtype="0" fill="hold" nodeType="afterEffect">
+                                  <p:stCondLst>
+                                    <p:cond delay="3000"/>
+                                  </p:stCondLst>
+                                  <p:childTnLst>
+                                    <p:set>
+                                      <p:cBhvr>
+                                        <p:cTn id="24" dur="1" fill="hold">
+                                          <p:stCondLst>
+                                            <p:cond delay="0"/>
+                                          </p:stCondLst>
+                                        </p:cTn>
+                                        <p:tgtEl>
+                                          <p:spTgt spid="5">
+                                            <p:txEl>
+                                              <p:pRg st="4" end="4"/>
+                                            </p:txEl>
+                                          </p:spTgt>
+                                        </p:tgtEl>
+                                        <p:attrNameLst>
+                                          <p:attrName>style.visibility</p:attrName>
+                                        </p:attrNameLst>
+                                      </p:cBhvr>
+                                      <p:to>
+                                        <p:strVal val="visible"/>
+                                      </p:to>
+                                    </p:set>
+                                  </p:childTnLst>
+                                </p:cTn>
+                              </p:par>
+                            </p:childTnLst>
+                          </p:cTn>
+                        </p:par>
+                        <p:par>
+                          <p:cTn id="25" fill="hold">
+                            <p:stCondLst>
+                              <p:cond delay="15000"/>
+                            </p:stCondLst>
+                            <p:childTnLst>
+                              <p:par>
+                                <p:cTn id="26" presetID="1" presetClass="entr" presetSubtype="0" fill="hold" nodeType="afterEffect">
+                                  <p:stCondLst>
+                                    <p:cond delay="0"/>
+                                  </p:stCondLst>
+                                  <p:childTnLst>
+                                    <p:set>
+                                      <p:cBhvr>
+                                        <p:cTn id="27" dur="1" fill="hold">
+                                          <p:stCondLst>
+                                            <p:cond delay="0"/>
+                                          </p:stCondLst>
+                                        </p:cTn>
+                                        <p:tgtEl>
+                                          <p:spTgt spid="19"/>
+                                        </p:tgtEl>
+                                        <p:attrNameLst>
+                                          <p:attrName>style.visibility</p:attrName>
+                                        </p:attrNameLst>
+                                      </p:cBhvr>
+                                      <p:to>
+                                        <p:strVal val="visible"/>
+                                      </p:to>
+                                    </p:set>
+                                  </p:childTnLst>
+                                </p:cTn>
+                              </p:par>
+                            </p:childTnLst>
+                          </p:cTn>
+                        </p:par>
+                        <p:par>
+                          <p:cTn id="28" fill="hold">
+                            <p:stCondLst>
+                              <p:cond delay="15000"/>
+                            </p:stCondLst>
+                            <p:childTnLst>
+                              <p:par>
+                                <p:cTn id="29" presetID="1" presetClass="entr" presetSubtype="0" fill="hold" nodeType="afterEffect">
+                                  <p:stCondLst>
+                                    <p:cond delay="3000"/>
+                                  </p:stCondLst>
+                                  <p:childTnLst>
+                                    <p:set>
+                                      <p:cBhvr>
+                                        <p:cTn id="30" dur="1" fill="hold">
+                                          <p:stCondLst>
+                                            <p:cond delay="0"/>
+                                          </p:stCondLst>
+                                        </p:cTn>
+                                        <p:tgtEl>
+                                          <p:spTgt spid="5">
+                                            <p:txEl>
+                                              <p:pRg st="5" end="5"/>
+                                            </p:txEl>
+                                          </p:spTgt>
+                                        </p:tgtEl>
+                                        <p:attrNameLst>
+                                          <p:attrName>style.visibility</p:attrName>
+                                        </p:attrNameLst>
+                                      </p:cBhvr>
+                                      <p:to>
+                                        <p:strVal val="visible"/>
+                                      </p:to>
+                                    </p:set>
+                                  </p:childTnLst>
+                                </p:cTn>
+                              </p:par>
+                            </p:childTnLst>
+                          </p:cTn>
+                        </p:par>
+                        <p:par>
+                          <p:cTn id="31" fill="hold">
+                            <p:stCondLst>
+                              <p:cond delay="18000"/>
+                            </p:stCondLst>
+                            <p:childTnLst>
+                              <p:par>
+                                <p:cTn id="32" presetID="1" presetClass="entr" presetSubtype="0" fill="hold" nodeType="afterEffect">
+                                  <p:stCondLst>
+                                    <p:cond delay="3000"/>
+                                  </p:stCondLst>
+                                  <p:childTnLst>
+                                    <p:set>
+                                      <p:cBhvr>
+                                        <p:cTn id="33" dur="1" fill="hold">
+                                          <p:stCondLst>
+                                            <p:cond delay="0"/>
+                                          </p:stCondLst>
+                                        </p:cTn>
+                                        <p:tgtEl>
+                                          <p:spTgt spid="5">
+                                            <p:txEl>
+                                              <p:pRg st="6" end="6"/>
+                                            </p:txEl>
+                                          </p:spTgt>
+                                        </p:tgtEl>
+                                        <p:attrNameLst>
+                                          <p:attrName>style.visibility</p:attrName>
+                                        </p:attrNameLst>
+                                      </p:cBhvr>
+                                      <p:to>
+                                        <p:strVal val="visible"/>
+                                      </p:to>
+                                    </p:set>
+                                  </p:childTnLst>
+                                </p:cTn>
+                              </p:par>
+                            </p:childTnLst>
+                          </p:cTn>
+                        </p:par>
+                        <p:par>
+                          <p:cTn id="34" fill="hold">
+                            <p:stCondLst>
+                              <p:cond delay="21000"/>
+                            </p:stCondLst>
+                            <p:childTnLst>
+                              <p:par>
+                                <p:cTn id="35" presetID="1" presetClass="entr" presetSubtype="0" fill="hold" nodeType="afterEffect">
+                                  <p:stCondLst>
+                                    <p:cond delay="0"/>
+                                  </p:stCondLst>
+                                  <p:childTnLst>
+                                    <p:set>
+                                      <p:cBhvr>
+                                        <p:cTn id="36" dur="1" fill="hold">
+                                          <p:stCondLst>
+                                            <p:cond delay="0"/>
+                                          </p:stCondLst>
+                                        </p:cTn>
+                                        <p:tgtEl>
+                                          <p:spTgt spid="21"/>
+                                        </p:tgtEl>
+                                        <p:attrNameLst>
+                                          <p:attrName>style.visibility</p:attrName>
+                                        </p:attrNameLst>
+                                      </p:cBhvr>
+                                      <p:to>
+                                        <p:strVal val="visible"/>
+                                      </p:to>
+                                    </p:set>
+                                  </p:childTnLst>
+                                </p:cTn>
+                              </p:par>
+                            </p:childTnLst>
+                          </p:cTn>
+                        </p:par>
+                        <p:par>
+                          <p:cTn id="37" fill="hold">
+                            <p:stCondLst>
+                              <p:cond delay="21000"/>
+                            </p:stCondLst>
+                            <p:childTnLst>
+                              <p:par>
+                                <p:cTn id="38" presetID="1" presetClass="entr" presetSubtype="0" fill="hold" nodeType="afterEffect">
+                                  <p:stCondLst>
+                                    <p:cond delay="3000"/>
+                                  </p:stCondLst>
+                                  <p:childTnLst>
+                                    <p:set>
+                                      <p:cBhvr>
+                                        <p:cTn id="39" dur="1" fill="hold">
+                                          <p:stCondLst>
+                                            <p:cond delay="0"/>
+                                          </p:stCondLst>
+                                        </p:cTn>
+                                        <p:tgtEl>
+                                          <p:spTgt spid="5">
+                                            <p:txEl>
+                                              <p:pRg st="7" end="7"/>
+                                            </p:txEl>
+                                          </p:spTgt>
+                                        </p:tgtEl>
+                                        <p:attrNameLst>
+                                          <p:attrName>style.visibility</p:attrName>
+                                        </p:attrNameLst>
+                                      </p:cBhvr>
+                                      <p:to>
+                                        <p:strVal val="visible"/>
+                                      </p:to>
+                                    </p:set>
+                                  </p:childTnLst>
+                                </p:cTn>
+                              </p:par>
+                            </p:childTnLst>
+                          </p:cTn>
+                        </p:par>
+                      </p:childTnLst>
+                    </p:cTn>
+                  </p:par>
+                </p:childTnLst>
+              </p:cTn>
+              <p:prevCondLst>
+                <p:cond evt="onPrev" delay="0">
+                  <p:tgtEl>
+                    <p:sldTgt/>
+                  </p:tgtEl>
+                </p:cond>
+              </p:prevCondLst>
+              <p:nextCondLst>
+                <p:cond evt="onNext" delay="0">
+                  <p:tgtEl>
+                    <p:sldTgt/>
+                  </p:tgtEl>
+                </p:cond>
+              </p:nextCondLst>
+            </p:seq>
+          </p:childTnLst>
+        </p:cTn>
+      </p:par>
+    </p:tnLst>
+  </p:timing>
 </p:sld>
 </file>
 

</xml_diff>